<commit_message>
[FIX] session 4 typo
</commit_message>
<xml_diff>
--- a/lectures/TAC-Session04.pptx
+++ b/lectures/TAC-Session04.pptx
@@ -129,7 +129,7 @@
 <file path=ppt/revisionInfo.xml><?xml version="1.0" encoding="utf-8"?>
 <p1510:revInfo xmlns:a="http://schemas.openxmlformats.org/drawingml/2006/main" xmlns:r="http://schemas.openxmlformats.org/officeDocument/2006/relationships" xmlns:p1510="http://schemas.microsoft.com/office/powerpoint/2015/10/main">
   <p1510:revLst>
-    <p1510:client id="{49A4C28C-AE32-0211-8D32-73DA8BBCF05D}" v="1383" dt="2024-09-23T19:49:52.589"/>
+    <p1510:client id="{37451A18-FEFB-D85C-977E-3E738C7875C7}" v="6" dt="2024-09-27T10:07:59.299"/>
   </p1510:revLst>
 </p1510:revInfo>
 </file>
@@ -263,7 +263,7 @@
           <a:p>
             <a:fld id="{E431C0BB-DC71-4713-A787-95011EDB8CA8}" type="datetimeFigureOut">
               <a:rPr lang="pt-PT" smtClean="0"/>
-              <a:t>26/09/2024</a:t>
+              <a:t>27/09/2024</a:t>
             </a:fld>
             <a:endParaRPr lang="pt-PT"/>
           </a:p>
@@ -431,7 +431,7 @@
           <a:p>
             <a:fld id="{E431C0BB-DC71-4713-A787-95011EDB8CA8}" type="datetimeFigureOut">
               <a:rPr lang="pt-PT" smtClean="0"/>
-              <a:t>26/09/2024</a:t>
+              <a:t>27/09/2024</a:t>
             </a:fld>
             <a:endParaRPr lang="pt-PT"/>
           </a:p>
@@ -609,7 +609,7 @@
           <a:p>
             <a:fld id="{E431C0BB-DC71-4713-A787-95011EDB8CA8}" type="datetimeFigureOut">
               <a:rPr lang="pt-PT" smtClean="0"/>
-              <a:t>26/09/2024</a:t>
+              <a:t>27/09/2024</a:t>
             </a:fld>
             <a:endParaRPr lang="pt-PT"/>
           </a:p>
@@ -777,7 +777,7 @@
           <a:p>
             <a:fld id="{E431C0BB-DC71-4713-A787-95011EDB8CA8}" type="datetimeFigureOut">
               <a:rPr lang="pt-PT" smtClean="0"/>
-              <a:t>26/09/2024</a:t>
+              <a:t>27/09/2024</a:t>
             </a:fld>
             <a:endParaRPr lang="pt-PT"/>
           </a:p>
@@ -1022,7 +1022,7 @@
           <a:p>
             <a:fld id="{E431C0BB-DC71-4713-A787-95011EDB8CA8}" type="datetimeFigureOut">
               <a:rPr lang="pt-PT" smtClean="0"/>
-              <a:t>26/09/2024</a:t>
+              <a:t>27/09/2024</a:t>
             </a:fld>
             <a:endParaRPr lang="pt-PT"/>
           </a:p>
@@ -1251,7 +1251,7 @@
           <a:p>
             <a:fld id="{E431C0BB-DC71-4713-A787-95011EDB8CA8}" type="datetimeFigureOut">
               <a:rPr lang="pt-PT" smtClean="0"/>
-              <a:t>26/09/2024</a:t>
+              <a:t>27/09/2024</a:t>
             </a:fld>
             <a:endParaRPr lang="pt-PT"/>
           </a:p>
@@ -1615,7 +1615,7 @@
           <a:p>
             <a:fld id="{E431C0BB-DC71-4713-A787-95011EDB8CA8}" type="datetimeFigureOut">
               <a:rPr lang="pt-PT" smtClean="0"/>
-              <a:t>26/09/2024</a:t>
+              <a:t>27/09/2024</a:t>
             </a:fld>
             <a:endParaRPr lang="pt-PT"/>
           </a:p>
@@ -1732,7 +1732,7 @@
           <a:p>
             <a:fld id="{E431C0BB-DC71-4713-A787-95011EDB8CA8}" type="datetimeFigureOut">
               <a:rPr lang="pt-PT" smtClean="0"/>
-              <a:t>26/09/2024</a:t>
+              <a:t>27/09/2024</a:t>
             </a:fld>
             <a:endParaRPr lang="pt-PT"/>
           </a:p>
@@ -1827,7 +1827,7 @@
           <a:p>
             <a:fld id="{E431C0BB-DC71-4713-A787-95011EDB8CA8}" type="datetimeFigureOut">
               <a:rPr lang="pt-PT" smtClean="0"/>
-              <a:t>26/09/2024</a:t>
+              <a:t>27/09/2024</a:t>
             </a:fld>
             <a:endParaRPr lang="pt-PT"/>
           </a:p>
@@ -2102,7 +2102,7 @@
           <a:p>
             <a:fld id="{E431C0BB-DC71-4713-A787-95011EDB8CA8}" type="datetimeFigureOut">
               <a:rPr lang="pt-PT" smtClean="0"/>
-              <a:t>26/09/2024</a:t>
+              <a:t>27/09/2024</a:t>
             </a:fld>
             <a:endParaRPr lang="pt-PT"/>
           </a:p>
@@ -2354,7 +2354,7 @@
           <a:p>
             <a:fld id="{E431C0BB-DC71-4713-A787-95011EDB8CA8}" type="datetimeFigureOut">
               <a:rPr lang="pt-PT" smtClean="0"/>
-              <a:t>26/09/2024</a:t>
+              <a:t>27/09/2024</a:t>
             </a:fld>
             <a:endParaRPr lang="pt-PT"/>
           </a:p>
@@ -2565,7 +2565,7 @@
           <a:p>
             <a:fld id="{E431C0BB-DC71-4713-A787-95011EDB8CA8}" type="datetimeFigureOut">
               <a:rPr lang="pt-PT" smtClean="0"/>
-              <a:t>26/09/2024</a:t>
+              <a:t>27/09/2024</a:t>
             </a:fld>
             <a:endParaRPr lang="pt-PT"/>
           </a:p>
@@ -12885,7 +12885,7 @@
                 <a:ea typeface="+mn-lt"/>
                 <a:cs typeface="+mn-lt"/>
               </a:rPr>
-              <a:t> y </a:t>
+              <a:t> Y </a:t>
             </a:r>
             <a:r>
               <a:rPr lang="pt-PT" sz="2200" dirty="0" err="1">
@@ -12997,14 +12997,14 @@
                 <a:ea typeface="+mn-lt"/>
                 <a:cs typeface="+mn-lt"/>
               </a:rPr>
-              <a:t> </a:t>
+              <a:t> d</a:t>
             </a:r>
             <a:r>
               <a:rPr lang="pt-PT" sz="2200" baseline="-25000" dirty="0">
                 <a:ea typeface="+mn-lt"/>
                 <a:cs typeface="+mn-lt"/>
               </a:rPr>
-              <a:t>d2</a:t>
+              <a:t>2</a:t>
             </a:r>
             <a:r>
               <a:rPr lang="pt-PT" sz="2200" dirty="0">

</xml_diff>